<commit_message>
Updating slides to make examples consistent.
</commit_message>
<xml_diff>
--- a/Slides/Using_R_CHPC.pptx
+++ b/Slides/Using_R_CHPC.pptx
@@ -223,7 +223,7 @@
           <a:p>
             <a:fld id="{2F361DCF-91DB-154F-A19C-38216DFD6AD4}" type="datetimeFigureOut">
               <a:rPr lang="en-US" smtClean="0"/>
-              <a:t>7/18/24</a:t>
+              <a:t>11/12/24</a:t>
             </a:fld>
             <a:endParaRPr lang="en-US"/>
           </a:p>
@@ -721,7 +721,7 @@
           <a:p>
             <a:fld id="{3AE11A57-48AB-524B-8983-18A254FEB5A1}" type="datetimeFigureOut">
               <a:rPr lang="en-US" smtClean="0"/>
-              <a:t>7/18/24</a:t>
+              <a:t>11/12/24</a:t>
             </a:fld>
             <a:endParaRPr lang="en-US"/>
           </a:p>
@@ -919,7 +919,7 @@
           <a:p>
             <a:fld id="{3AE11A57-48AB-524B-8983-18A254FEB5A1}" type="datetimeFigureOut">
               <a:rPr lang="en-US" smtClean="0"/>
-              <a:t>7/18/24</a:t>
+              <a:t>11/12/24</a:t>
             </a:fld>
             <a:endParaRPr lang="en-US"/>
           </a:p>
@@ -1127,7 +1127,7 @@
           <a:p>
             <a:fld id="{3AE11A57-48AB-524B-8983-18A254FEB5A1}" type="datetimeFigureOut">
               <a:rPr lang="en-US" smtClean="0"/>
-              <a:t>7/18/24</a:t>
+              <a:t>11/12/24</a:t>
             </a:fld>
             <a:endParaRPr lang="en-US"/>
           </a:p>
@@ -1325,7 +1325,7 @@
           <a:p>
             <a:fld id="{3AE11A57-48AB-524B-8983-18A254FEB5A1}" type="datetimeFigureOut">
               <a:rPr lang="en-US" smtClean="0"/>
-              <a:t>7/18/24</a:t>
+              <a:t>11/12/24</a:t>
             </a:fld>
             <a:endParaRPr lang="en-US"/>
           </a:p>
@@ -1600,7 +1600,7 @@
           <a:p>
             <a:fld id="{3AE11A57-48AB-524B-8983-18A254FEB5A1}" type="datetimeFigureOut">
               <a:rPr lang="en-US" smtClean="0"/>
-              <a:t>7/18/24</a:t>
+              <a:t>11/12/24</a:t>
             </a:fld>
             <a:endParaRPr lang="en-US"/>
           </a:p>
@@ -1865,7 +1865,7 @@
           <a:p>
             <a:fld id="{3AE11A57-48AB-524B-8983-18A254FEB5A1}" type="datetimeFigureOut">
               <a:rPr lang="en-US" smtClean="0"/>
-              <a:t>7/18/24</a:t>
+              <a:t>11/12/24</a:t>
             </a:fld>
             <a:endParaRPr lang="en-US"/>
           </a:p>
@@ -2277,7 +2277,7 @@
           <a:p>
             <a:fld id="{3AE11A57-48AB-524B-8983-18A254FEB5A1}" type="datetimeFigureOut">
               <a:rPr lang="en-US" smtClean="0"/>
-              <a:t>7/18/24</a:t>
+              <a:t>11/12/24</a:t>
             </a:fld>
             <a:endParaRPr lang="en-US"/>
           </a:p>
@@ -2418,7 +2418,7 @@
           <a:p>
             <a:fld id="{3AE11A57-48AB-524B-8983-18A254FEB5A1}" type="datetimeFigureOut">
               <a:rPr lang="en-US" smtClean="0"/>
-              <a:t>7/18/24</a:t>
+              <a:t>11/12/24</a:t>
             </a:fld>
             <a:endParaRPr lang="en-US"/>
           </a:p>
@@ -2531,7 +2531,7 @@
           <a:p>
             <a:fld id="{3AE11A57-48AB-524B-8983-18A254FEB5A1}" type="datetimeFigureOut">
               <a:rPr lang="en-US" smtClean="0"/>
-              <a:t>7/18/24</a:t>
+              <a:t>11/12/24</a:t>
             </a:fld>
             <a:endParaRPr lang="en-US"/>
           </a:p>
@@ -2842,7 +2842,7 @@
           <a:p>
             <a:fld id="{3AE11A57-48AB-524B-8983-18A254FEB5A1}" type="datetimeFigureOut">
               <a:rPr lang="en-US" smtClean="0"/>
-              <a:t>7/18/24</a:t>
+              <a:t>11/12/24</a:t>
             </a:fld>
             <a:endParaRPr lang="en-US"/>
           </a:p>
@@ -3130,7 +3130,7 @@
           <a:p>
             <a:fld id="{3AE11A57-48AB-524B-8983-18A254FEB5A1}" type="datetimeFigureOut">
               <a:rPr lang="en-US" smtClean="0"/>
-              <a:t>7/18/24</a:t>
+              <a:t>11/12/24</a:t>
             </a:fld>
             <a:endParaRPr lang="en-US"/>
           </a:p>
@@ -3371,7 +3371,7 @@
           <a:p>
             <a:fld id="{3AE11A57-48AB-524B-8983-18A254FEB5A1}" type="datetimeFigureOut">
               <a:rPr lang="en-US" smtClean="0"/>
-              <a:t>7/18/24</a:t>
+              <a:t>11/12/24</a:t>
             </a:fld>
             <a:endParaRPr lang="en-US"/>
           </a:p>
@@ -3851,7 +3851,7 @@
           <a:p>
             <a:r>
               <a:rPr lang="en-US" dirty="0"/>
-              <a:t>07/18/2024</a:t>
+              <a:t>11/13/2024</a:t>
             </a:r>
           </a:p>
         </p:txBody>
@@ -7449,7 +7449,7 @@
         <p:spPr>
           <a:xfrm>
             <a:off x="838200" y="2385321"/>
-            <a:ext cx="10001003" cy="4278094"/>
+            <a:ext cx="10001003" cy="3785652"/>
           </a:xfrm>
           <a:prstGeom prst="rect">
             <a:avLst/>
@@ -7525,7 +7525,7 @@
                 <a:effectLst/>
                 <a:latin typeface="Menlo" panose="020B0609030804020204" pitchFamily="49" charset="0"/>
               </a:rPr>
-              <a:t>R version 4.2.2 (2022-10-31) -- "Innocent and Trusting”</a:t>
+              <a:t>R version 4.4.0 (2024-04-24) -- "Puppy Cup”</a:t>
             </a:r>
           </a:p>
           <a:p>
@@ -7651,7 +7651,27 @@
                 <a:effectLst/>
                 <a:latin typeface="Menlo" panose="020B0609030804020204" pitchFamily="49" charset="0"/>
               </a:rPr>
-              <a:t>/r8/R/4.2.2/lib64/R/library"</a:t>
+              <a:t>/r8/</a:t>
+            </a:r>
+            <a:r>
+              <a:rPr lang="en-US" sz="1600" dirty="0" err="1">
+                <a:solidFill>
+                  <a:srgbClr val="000000"/>
+                </a:solidFill>
+                <a:effectLst/>
+                <a:latin typeface="Menlo" panose="020B0609030804020204" pitchFamily="49" charset="0"/>
+              </a:rPr>
+              <a:t>RLibs</a:t>
+            </a:r>
+            <a:r>
+              <a:rPr lang="en-US" sz="1600" dirty="0">
+                <a:solidFill>
+                  <a:srgbClr val="000000"/>
+                </a:solidFill>
+                <a:effectLst/>
+                <a:latin typeface="Menlo" panose="020B0609030804020204" pitchFamily="49" charset="0"/>
+              </a:rPr>
+              <a:t>/4.4.0"            </a:t>
             </a:r>
           </a:p>
           <a:p>
@@ -7723,6 +7743,130 @@
                 <a:effectLst/>
                 <a:latin typeface="Menlo" panose="020B0609030804020204" pitchFamily="49" charset="0"/>
               </a:rPr>
+              <a:t>/r8/R/4.4.0/lib64/R/library"</a:t>
+            </a:r>
+          </a:p>
+          <a:p>
+            <a:r>
+              <a:rPr lang="en-US" sz="1600" dirty="0">
+                <a:solidFill>
+                  <a:srgbClr val="000000"/>
+                </a:solidFill>
+                <a:effectLst/>
+                <a:latin typeface="Menlo" panose="020B0609030804020204" pitchFamily="49" charset="0"/>
+              </a:rPr>
+              <a:t>&gt; </a:t>
+            </a:r>
+            <a:r>
+              <a:rPr lang="en-US" sz="1600" dirty="0" err="1">
+                <a:solidFill>
+                  <a:srgbClr val="0070C0"/>
+                </a:solidFill>
+                <a:effectLst/>
+                <a:latin typeface="Menlo" panose="020B0609030804020204" pitchFamily="49" charset="0"/>
+              </a:rPr>
+              <a:t>install.packages</a:t>
+            </a:r>
+            <a:r>
+              <a:rPr lang="en-US" sz="1600" dirty="0">
+                <a:solidFill>
+                  <a:srgbClr val="0070C0"/>
+                </a:solidFill>
+                <a:effectLst/>
+                <a:latin typeface="Menlo" panose="020B0609030804020204" pitchFamily="49" charset="0"/>
+              </a:rPr>
+              <a:t>("</a:t>
+            </a:r>
+            <a:r>
+              <a:rPr lang="en-US" sz="1600" dirty="0" err="1">
+                <a:solidFill>
+                  <a:srgbClr val="0070C0"/>
+                </a:solidFill>
+                <a:effectLst/>
+                <a:latin typeface="Menlo" panose="020B0609030804020204" pitchFamily="49" charset="0"/>
+              </a:rPr>
+              <a:t>solaR</a:t>
+            </a:r>
+            <a:r>
+              <a:rPr lang="en-US" sz="1600" dirty="0">
+                <a:solidFill>
+                  <a:srgbClr val="0070C0"/>
+                </a:solidFill>
+                <a:effectLst/>
+                <a:latin typeface="Menlo" panose="020B0609030804020204" pitchFamily="49" charset="0"/>
+              </a:rPr>
+              <a:t>")</a:t>
+            </a:r>
+          </a:p>
+          <a:p>
+            <a:r>
+              <a:rPr lang="en-US" sz="1600" dirty="0">
+                <a:solidFill>
+                  <a:srgbClr val="000000"/>
+                </a:solidFill>
+                <a:effectLst/>
+                <a:latin typeface="Menlo" panose="020B0609030804020204" pitchFamily="49" charset="0"/>
+              </a:rPr>
+              <a:t>Installing package into ‘/</a:t>
+            </a:r>
+            <a:r>
+              <a:rPr lang="en-US" sz="1600" dirty="0" err="1">
+                <a:solidFill>
+                  <a:srgbClr val="000000"/>
+                </a:solidFill>
+                <a:effectLst/>
+                <a:latin typeface="Menlo" panose="020B0609030804020204" pitchFamily="49" charset="0"/>
+              </a:rPr>
+              <a:t>uufs</a:t>
+            </a:r>
+            <a:r>
+              <a:rPr lang="en-US" sz="1600" dirty="0">
+                <a:solidFill>
+                  <a:srgbClr val="000000"/>
+                </a:solidFill>
+                <a:effectLst/>
+                <a:latin typeface="Menlo" panose="020B0609030804020204" pitchFamily="49" charset="0"/>
+              </a:rPr>
+              <a:t>/</a:t>
+            </a:r>
+            <a:r>
+              <a:rPr lang="en-US" sz="1600" dirty="0" err="1">
+                <a:solidFill>
+                  <a:srgbClr val="000000"/>
+                </a:solidFill>
+                <a:effectLst/>
+                <a:latin typeface="Menlo" panose="020B0609030804020204" pitchFamily="49" charset="0"/>
+              </a:rPr>
+              <a:t>chpc.utah.edu</a:t>
+            </a:r>
+            <a:r>
+              <a:rPr lang="en-US" sz="1600" dirty="0">
+                <a:solidFill>
+                  <a:srgbClr val="000000"/>
+                </a:solidFill>
+                <a:effectLst/>
+                <a:latin typeface="Menlo" panose="020B0609030804020204" pitchFamily="49" charset="0"/>
+              </a:rPr>
+              <a:t>/sys/</a:t>
+            </a:r>
+            <a:r>
+              <a:rPr lang="en-US" sz="1600" dirty="0" err="1">
+                <a:solidFill>
+                  <a:srgbClr val="000000"/>
+                </a:solidFill>
+                <a:effectLst/>
+                <a:latin typeface="Menlo" panose="020B0609030804020204" pitchFamily="49" charset="0"/>
+              </a:rPr>
+              <a:t>installdir</a:t>
+            </a:r>
+            <a:r>
+              <a:rPr lang="en-US" sz="1600" dirty="0">
+                <a:solidFill>
+                  <a:srgbClr val="000000"/>
+                </a:solidFill>
+                <a:effectLst/>
+                <a:latin typeface="Menlo" panose="020B0609030804020204" pitchFamily="49" charset="0"/>
+              </a:rPr>
               <a:t>/r8/</a:t>
             </a:r>
             <a:r>
@@ -7743,24 +7887,36 @@
                 <a:effectLst/>
                 <a:latin typeface="Menlo" panose="020B0609030804020204" pitchFamily="49" charset="0"/>
               </a:rPr>
-              <a:t>/4.2.2”</a:t>
-            </a:r>
-          </a:p>
-          <a:p>
-            <a:r>
-              <a:rPr lang="en-US" sz="1600" dirty="0">
-                <a:solidFill>
-                  <a:srgbClr val="000000"/>
-                </a:solidFill>
-                <a:effectLst/>
-                <a:latin typeface="Menlo" panose="020B0609030804020204" pitchFamily="49" charset="0"/>
-              </a:rPr>
-              <a:t>&gt; </a:t>
+              <a:t>/4.4.0’</a:t>
+            </a:r>
+          </a:p>
+          <a:p>
+            <a:r>
+              <a:rPr lang="en-US" sz="1600" dirty="0">
+                <a:solidFill>
+                  <a:srgbClr val="000000"/>
+                </a:solidFill>
+                <a:effectLst/>
+                <a:latin typeface="Menlo" panose="020B0609030804020204" pitchFamily="49" charset="0"/>
+              </a:rPr>
+              <a:t>(as ‘lib’ is unspecified)</a:t>
+            </a:r>
+          </a:p>
+          <a:p>
+            <a:r>
+              <a:rPr lang="en-US" sz="1600" dirty="0">
+                <a:solidFill>
+                  <a:srgbClr val="000000"/>
+                </a:solidFill>
+                <a:effectLst/>
+                <a:latin typeface="Menlo" panose="020B0609030804020204" pitchFamily="49" charset="0"/>
+              </a:rPr>
+              <a:t>Warning in </a:t>
             </a:r>
             <a:r>
               <a:rPr lang="en-US" sz="1600" dirty="0" err="1">
                 <a:solidFill>
-                  <a:srgbClr val="0070C0"/>
+                  <a:srgbClr val="000000"/>
                 </a:solidFill>
                 <a:effectLst/>
                 <a:latin typeface="Menlo" panose="020B0609030804020204" pitchFamily="49" charset="0"/>
@@ -7770,7 +7926,7 @@
             <a:r>
               <a:rPr lang="en-US" sz="1600" dirty="0">
                 <a:solidFill>
-                  <a:srgbClr val="0070C0"/>
+                  <a:srgbClr val="000000"/>
                 </a:solidFill>
                 <a:effectLst/>
                 <a:latin typeface="Menlo" panose="020B0609030804020204" pitchFamily="49" charset="0"/>
@@ -7780,7 +7936,7 @@
             <a:r>
               <a:rPr lang="en-US" sz="1600" dirty="0" err="1">
                 <a:solidFill>
-                  <a:srgbClr val="0070C0"/>
+                  <a:srgbClr val="000000"/>
                 </a:solidFill>
                 <a:effectLst/>
                 <a:latin typeface="Menlo" panose="020B0609030804020204" pitchFamily="49" charset="0"/>
@@ -7790,24 +7946,24 @@
             <a:r>
               <a:rPr lang="en-US" sz="1600" dirty="0">
                 <a:solidFill>
-                  <a:srgbClr val="0070C0"/>
-                </a:solidFill>
-                <a:effectLst/>
-                <a:latin typeface="Menlo" panose="020B0609030804020204" pitchFamily="49" charset="0"/>
-              </a:rPr>
-              <a:t>")</a:t>
-            </a:r>
-          </a:p>
-          <a:p>
-            <a:r>
-              <a:rPr lang="en-US" sz="1600" dirty="0">
-                <a:solidFill>
-                  <a:srgbClr val="000000"/>
-                </a:solidFill>
-                <a:effectLst/>
-                <a:latin typeface="Menlo" panose="020B0609030804020204" pitchFamily="49" charset="0"/>
-              </a:rPr>
-              <a:t>Installing package into ‘/</a:t>
+                  <a:srgbClr val="000000"/>
+                </a:solidFill>
+                <a:effectLst/>
+                <a:latin typeface="Menlo" panose="020B0609030804020204" pitchFamily="49" charset="0"/>
+              </a:rPr>
+              <a:t>") :</a:t>
+            </a:r>
+          </a:p>
+          <a:p>
+            <a:r>
+              <a:rPr lang="en-US" sz="1600" dirty="0">
+                <a:solidFill>
+                  <a:srgbClr val="000000"/>
+                </a:solidFill>
+                <a:effectLst/>
+                <a:latin typeface="Menlo" panose="020B0609030804020204" pitchFamily="49" charset="0"/>
+              </a:rPr>
+              <a:t>  'lib = "/</a:t>
             </a:r>
             <a:r>
               <a:rPr lang="en-US" sz="1600" dirty="0" err="1">
@@ -7867,31 +8023,7 @@
                 <a:effectLst/>
                 <a:latin typeface="Menlo" panose="020B0609030804020204" pitchFamily="49" charset="0"/>
               </a:rPr>
-              <a:t>/r8/R/4.2.2/lib64/R/library’</a:t>
-            </a:r>
-          </a:p>
-          <a:p>
-            <a:r>
-              <a:rPr lang="en-US" sz="1600" dirty="0">
-                <a:solidFill>
-                  <a:srgbClr val="000000"/>
-                </a:solidFill>
-                <a:effectLst/>
-                <a:latin typeface="Menlo" panose="020B0609030804020204" pitchFamily="49" charset="0"/>
-              </a:rPr>
-              <a:t>(as ‘lib’ is unspecified)</a:t>
-            </a:r>
-          </a:p>
-          <a:p>
-            <a:r>
-              <a:rPr lang="en-US" sz="1600" dirty="0">
-                <a:solidFill>
-                  <a:srgbClr val="000000"/>
-                </a:solidFill>
-                <a:effectLst/>
-                <a:latin typeface="Menlo" panose="020B0609030804020204" pitchFamily="49" charset="0"/>
-              </a:rPr>
-              <a:t>Warning in </a:t>
+              <a:t>/r8/</a:t>
             </a:r>
             <a:r>
               <a:rPr lang="en-US" sz="1600" dirty="0" err="1">
@@ -7901,109 +8033,17 @@
                 <a:effectLst/>
                 <a:latin typeface="Menlo" panose="020B0609030804020204" pitchFamily="49" charset="0"/>
               </a:rPr>
-              <a:t>install.packages</a:t>
-            </a:r>
-            <a:r>
-              <a:rPr lang="en-US" sz="1600" dirty="0">
-                <a:solidFill>
-                  <a:srgbClr val="000000"/>
-                </a:solidFill>
-                <a:effectLst/>
-                <a:latin typeface="Menlo" panose="020B0609030804020204" pitchFamily="49" charset="0"/>
-              </a:rPr>
-              <a:t>("</a:t>
-            </a:r>
-            <a:r>
-              <a:rPr lang="en-US" sz="1600" dirty="0" err="1">
-                <a:solidFill>
-                  <a:srgbClr val="000000"/>
-                </a:solidFill>
-                <a:effectLst/>
-                <a:latin typeface="Menlo" panose="020B0609030804020204" pitchFamily="49" charset="0"/>
-              </a:rPr>
-              <a:t>solaR</a:t>
-            </a:r>
-            <a:r>
-              <a:rPr lang="en-US" sz="1600" dirty="0">
-                <a:solidFill>
-                  <a:srgbClr val="000000"/>
-                </a:solidFill>
-                <a:effectLst/>
-                <a:latin typeface="Menlo" panose="020B0609030804020204" pitchFamily="49" charset="0"/>
-              </a:rPr>
-              <a:t>") :</a:t>
-            </a:r>
-          </a:p>
-          <a:p>
-            <a:r>
-              <a:rPr lang="en-US" sz="1600" dirty="0">
-                <a:solidFill>
-                  <a:srgbClr val="000000"/>
-                </a:solidFill>
-                <a:effectLst/>
-                <a:latin typeface="Menlo" panose="020B0609030804020204" pitchFamily="49" charset="0"/>
-              </a:rPr>
-              <a:t>  'lib = "/</a:t>
-            </a:r>
-            <a:r>
-              <a:rPr lang="en-US" sz="1600" dirty="0" err="1">
-                <a:solidFill>
-                  <a:srgbClr val="000000"/>
-                </a:solidFill>
-                <a:effectLst/>
-                <a:latin typeface="Menlo" panose="020B0609030804020204" pitchFamily="49" charset="0"/>
-              </a:rPr>
-              <a:t>uufs</a:t>
-            </a:r>
-            <a:r>
-              <a:rPr lang="en-US" sz="1600" dirty="0">
-                <a:solidFill>
-                  <a:srgbClr val="000000"/>
-                </a:solidFill>
-                <a:effectLst/>
-                <a:latin typeface="Menlo" panose="020B0609030804020204" pitchFamily="49" charset="0"/>
-              </a:rPr>
-              <a:t>/</a:t>
-            </a:r>
-            <a:r>
-              <a:rPr lang="en-US" sz="1600" dirty="0" err="1">
-                <a:solidFill>
-                  <a:srgbClr val="000000"/>
-                </a:solidFill>
-                <a:effectLst/>
-                <a:latin typeface="Menlo" panose="020B0609030804020204" pitchFamily="49" charset="0"/>
-              </a:rPr>
-              <a:t>chpc.utah.edu</a:t>
-            </a:r>
-            <a:r>
-              <a:rPr lang="en-US" sz="1600" dirty="0">
-                <a:solidFill>
-                  <a:srgbClr val="000000"/>
-                </a:solidFill>
-                <a:effectLst/>
-                <a:latin typeface="Menlo" panose="020B0609030804020204" pitchFamily="49" charset="0"/>
-              </a:rPr>
-              <a:t>/sys/</a:t>
-            </a:r>
-            <a:r>
-              <a:rPr lang="en-US" sz="1600" dirty="0" err="1">
-                <a:solidFill>
-                  <a:srgbClr val="000000"/>
-                </a:solidFill>
-                <a:effectLst/>
-                <a:latin typeface="Menlo" panose="020B0609030804020204" pitchFamily="49" charset="0"/>
-              </a:rPr>
-              <a:t>installdir</a:t>
-            </a:r>
-            <a:r>
-              <a:rPr lang="en-US" sz="1600" dirty="0">
-                <a:solidFill>
-                  <a:srgbClr val="000000"/>
-                </a:solidFill>
-                <a:effectLst/>
-                <a:latin typeface="Menlo" panose="020B0609030804020204" pitchFamily="49" charset="0"/>
-              </a:rPr>
-              <a:t>/r8/R/4.2.2/lib64/R/library"' is not writable</a:t>
+              <a:t>RLibs</a:t>
+            </a:r>
+            <a:r>
+              <a:rPr lang="en-US" sz="1600" dirty="0">
+                <a:solidFill>
+                  <a:srgbClr val="000000"/>
+                </a:solidFill>
+                <a:effectLst/>
+                <a:latin typeface="Menlo" panose="020B0609030804020204" pitchFamily="49" charset="0"/>
+              </a:rPr>
+              <a:t>/4.4.0"' is not writable</a:t>
             </a:r>
           </a:p>
           <a:p>
@@ -8187,7 +8227,7 @@
                 <a:effectLst/>
                 <a:latin typeface="Menlo" panose="020B0609030804020204" pitchFamily="49" charset="0"/>
               </a:rPr>
-              <a:t>/common/home/u0424091/R/x86_64-pc-linux-gnu-library/4.2’</a:t>
+              <a:t>/common/home/u0424091/R/x86_64-pc-linux-gnu-library/4.4’</a:t>
             </a:r>
           </a:p>
           <a:p>
@@ -8204,7 +8244,7 @@
             <a:r>
               <a:rPr lang="en-US" sz="1600" dirty="0">
                 <a:solidFill>
-                  <a:srgbClr val="0070C0"/>
+                  <a:schemeClr val="accent1"/>
                 </a:solidFill>
                 <a:effectLst/>
                 <a:latin typeface="Menlo" panose="020B0609030804020204" pitchFamily="49" charset="0"/>
@@ -9036,7 +9076,7 @@
                 <a:effectLst/>
                 <a:latin typeface="Menlo" panose="020B0609030804020204" pitchFamily="49" charset="0"/>
               </a:rPr>
-              <a:t>/common/home/u0424091/R/x86_64-pc-linux-gnu-library/4.2/</a:t>
+              <a:t>/common/home/u0424091/R/x86_64-pc-linux-gnu-library/4.4/</a:t>
             </a:r>
             <a:r>
               <a:rPr lang="en-US" sz="1600" dirty="0" err="1">
@@ -9056,7 +9096,7 @@
                 <a:effectLst/>
                 <a:latin typeface="Menlo" panose="020B0609030804020204" pitchFamily="49" charset="0"/>
               </a:rPr>
-              <a:t>"</a:t>
+              <a:t>”</a:t>
             </a:r>
           </a:p>
           <a:p>
@@ -9150,7 +9190,7 @@
                 <a:effectLst/>
                 <a:latin typeface="Menlo" panose="020B0609030804020204" pitchFamily="49" charset="0"/>
               </a:rPr>
-              <a:t>/common/home/u0424091/R/x86_64-pc-linux-gnu-library/4.2"</a:t>
+              <a:t>/common/home/u0424091/R/x86_64-pc-linux-gnu-library/4.4"</a:t>
             </a:r>
           </a:p>
           <a:p>
@@ -9222,7 +9262,27 @@
                 <a:effectLst/>
                 <a:latin typeface="Menlo" panose="020B0609030804020204" pitchFamily="49" charset="0"/>
               </a:rPr>
-              <a:t>/r8/R/4.2.2/lib64/R/library"             </a:t>
+              <a:t>/r8/</a:t>
+            </a:r>
+            <a:r>
+              <a:rPr lang="en-US" sz="1600" dirty="0" err="1">
+                <a:solidFill>
+                  <a:srgbClr val="000000"/>
+                </a:solidFill>
+                <a:effectLst/>
+                <a:latin typeface="Menlo" panose="020B0609030804020204" pitchFamily="49" charset="0"/>
+              </a:rPr>
+              <a:t>RLibs</a:t>
+            </a:r>
+            <a:r>
+              <a:rPr lang="en-US" sz="1600" dirty="0">
+                <a:solidFill>
+                  <a:srgbClr val="000000"/>
+                </a:solidFill>
+                <a:effectLst/>
+                <a:latin typeface="Menlo" panose="020B0609030804020204" pitchFamily="49" charset="0"/>
+              </a:rPr>
+              <a:t>/4.4.0"                         </a:t>
             </a:r>
           </a:p>
           <a:p>
@@ -9294,27 +9354,7 @@
                 <a:effectLst/>
                 <a:latin typeface="Menlo" panose="020B0609030804020204" pitchFamily="49" charset="0"/>
               </a:rPr>
-              <a:t>/r8/</a:t>
-            </a:r>
-            <a:r>
-              <a:rPr lang="en-US" sz="1600" dirty="0" err="1">
-                <a:solidFill>
-                  <a:srgbClr val="000000"/>
-                </a:solidFill>
-                <a:effectLst/>
-                <a:latin typeface="Menlo" panose="020B0609030804020204" pitchFamily="49" charset="0"/>
-              </a:rPr>
-              <a:t>RLibs</a:t>
-            </a:r>
-            <a:r>
-              <a:rPr lang="en-US" sz="1600" dirty="0">
-                <a:solidFill>
-                  <a:srgbClr val="000000"/>
-                </a:solidFill>
-                <a:effectLst/>
-                <a:latin typeface="Menlo" panose="020B0609030804020204" pitchFamily="49" charset="0"/>
-              </a:rPr>
-              <a:t>/4.2.2" </a:t>
+              <a:t>/r8/R/4.4.0/lib64/R/library"</a:t>
             </a:r>
           </a:p>
         </p:txBody>
@@ -9579,7 +9619,7 @@
                 <a:effectLst/>
                 <a:latin typeface="Menlo" panose="020B0609030804020204" pitchFamily="49" charset="0"/>
               </a:rPr>
-              <a:t>module load R/4.2.2</a:t>
+              <a:t>module load R</a:t>
             </a:r>
           </a:p>
           <a:p>
@@ -10133,7 +10173,7 @@
                 <a:effectLst/>
                 <a:latin typeface="Menlo" panose="020B0609030804020204" pitchFamily="49" charset="0"/>
               </a:rPr>
-              <a:t>/r8/R/4.2.2/lib64/R/library’</a:t>
+              <a:t>/r8/R/4.4.0/lib64/R/library’</a:t>
             </a:r>
           </a:p>
           <a:p>
@@ -10269,7 +10309,7 @@
                 <a:effectLst/>
                 <a:latin typeface="Menlo" panose="020B0609030804020204" pitchFamily="49" charset="0"/>
               </a:rPr>
-              <a:t>/r8/R/4.2.2/lib64/R/library"' is not writable</a:t>
+              <a:t>/r8/R/4.4.0/lib64/R/library"' is not writable</a:t>
             </a:r>
           </a:p>
           <a:p>
@@ -11191,7 +11231,7 @@
                 <a:effectLst/>
                 <a:latin typeface="Menlo" panose="020B0609030804020204" pitchFamily="49" charset="0"/>
               </a:rPr>
-              <a:t>R/x86_64-pc-linux-gnu-library/4.2 limma_3.54.2.tar.gz</a:t>
+              <a:t>R/x86_64-pc-linux-gnu-library/4.4 limma_3.54.2.tar.gz</a:t>
             </a:r>
           </a:p>
         </p:txBody>
@@ -11327,10 +11367,24 @@
             </a:r>
           </a:p>
           <a:p>
-            <a:pPr marL="0" indent="0">
-              <a:buNone/>
-            </a:pPr>
-            <a:endParaRPr lang="en-US" dirty="0"/>
+            <a:r>
+              <a:rPr lang="en-US" dirty="0"/>
+              <a:t>Handles dependencies!</a:t>
+            </a:r>
+          </a:p>
+          <a:p>
+            <a:r>
+              <a:rPr lang="en-US" dirty="0"/>
+              <a:t>Installs by default into .</a:t>
+            </a:r>
+            <a:r>
+              <a:rPr lang="en-US" dirty="0" err="1"/>
+              <a:t>libPaths</a:t>
+            </a:r>
+            <a:r>
+              <a:rPr lang="en-US" dirty="0"/>
+              <a:t>()[1]</a:t>
+            </a:r>
           </a:p>
           <a:p>
             <a:r>
@@ -11438,7 +11492,15 @@
           <a:p>
             <a:r>
               <a:rPr lang="en-US" dirty="0"/>
-              <a:t>A SLURM job may not have access to all the cores on a node</a:t>
+              <a:t>A </a:t>
+            </a:r>
+            <a:r>
+              <a:rPr lang="en-US" dirty="0" err="1"/>
+              <a:t>Slurm</a:t>
+            </a:r>
+            <a:r>
+              <a:rPr lang="en-US" dirty="0"/>
+              <a:t> job (either interactive or batch) may not have access to all the cores on a node</a:t>
             </a:r>
           </a:p>
           <a:p>
@@ -11475,7 +11537,7 @@
         </p:nvSpPr>
         <p:spPr>
           <a:xfrm>
-            <a:off x="838200" y="2916984"/>
+            <a:off x="838200" y="3316375"/>
             <a:ext cx="4875053" cy="1077218"/>
           </a:xfrm>
           <a:prstGeom prst="rect">
@@ -11490,7 +11552,7 @@
           <a:lstStyle/>
           <a:p>
             <a:r>
-              <a:rPr lang="en-US" sz="1600" dirty="0">
+              <a:rPr lang="en-US" sz="1600" b="1" dirty="0">
                 <a:solidFill>
                   <a:srgbClr val="FF0000"/>
                 </a:solidFill>
@@ -11501,7 +11563,7 @@
           </a:p>
           <a:p>
             <a:r>
-              <a:rPr lang="en-US" sz="1600" dirty="0">
+              <a:rPr lang="en-US" sz="1600" b="1" dirty="0">
                 <a:solidFill>
                   <a:srgbClr val="FF0000"/>
                 </a:solidFill>
@@ -11513,7 +11575,7 @@
           </a:p>
           <a:p>
             <a:r>
-              <a:rPr lang="en-US" sz="1600" dirty="0">
+              <a:rPr lang="en-US" sz="1600" b="1" dirty="0">
                 <a:solidFill>
                   <a:srgbClr val="FF0000"/>
                 </a:solidFill>
@@ -11523,7 +11585,7 @@
               <a:t>&gt; </a:t>
             </a:r>
             <a:r>
-              <a:rPr lang="en-US" sz="1600" dirty="0" err="1">
+              <a:rPr lang="en-US" sz="1600" b="1" dirty="0" err="1">
                 <a:solidFill>
                   <a:srgbClr val="FF0000"/>
                 </a:solidFill>
@@ -11533,7 +11595,7 @@
               <a:t>detectCores</a:t>
             </a:r>
             <a:r>
-              <a:rPr lang="en-US" sz="1600" dirty="0">
+              <a:rPr lang="en-US" sz="1600" b="1" dirty="0">
                 <a:solidFill>
                   <a:srgbClr val="FF0000"/>
                 </a:solidFill>
@@ -11545,7 +11607,7 @@
           </a:p>
           <a:p>
             <a:r>
-              <a:rPr lang="en-US" sz="1600" dirty="0">
+              <a:rPr lang="en-US" sz="1600" b="1" dirty="0">
                 <a:solidFill>
                   <a:srgbClr val="FF0000"/>
                 </a:solidFill>
@@ -11571,8 +11633,8 @@
         </p:nvSpPr>
         <p:spPr>
           <a:xfrm>
-            <a:off x="838200" y="4684711"/>
-            <a:ext cx="8084264" cy="1569660"/>
+            <a:off x="838200" y="4842361"/>
+            <a:ext cx="8824852" cy="1569660"/>
           </a:xfrm>
           <a:prstGeom prst="rect">
             <a:avLst/>
@@ -11586,7 +11648,7 @@
           <a:lstStyle/>
           <a:p>
             <a:r>
-              <a:rPr lang="en-US" sz="1600" dirty="0">
+              <a:rPr lang="en-US" sz="1600" b="1" dirty="0">
                 <a:solidFill>
                   <a:srgbClr val="0070C0"/>
                 </a:solidFill>
@@ -11597,7 +11659,7 @@
           </a:p>
           <a:p>
             <a:r>
-              <a:rPr lang="en-US" sz="1600" dirty="0">
+              <a:rPr lang="en-US" sz="1600" b="1" dirty="0">
                 <a:solidFill>
                   <a:srgbClr val="0070C0"/>
                 </a:solidFill>
@@ -11607,7 +11669,7 @@
               <a:t>&gt; </a:t>
             </a:r>
             <a:r>
-              <a:rPr lang="en-US" sz="1600" dirty="0" err="1">
+              <a:rPr lang="en-US" sz="1600" b="1" dirty="0" err="1">
                 <a:solidFill>
                   <a:srgbClr val="0070C0"/>
                 </a:solidFill>
@@ -11617,7 +11679,7 @@
               <a:t>strtoi</a:t>
             </a:r>
             <a:r>
-              <a:rPr lang="en-US" sz="1600" dirty="0">
+              <a:rPr lang="en-US" sz="1600" b="1" dirty="0">
                 <a:solidFill>
                   <a:srgbClr val="0070C0"/>
                 </a:solidFill>
@@ -11627,7 +11689,7 @@
               <a:t>(</a:t>
             </a:r>
             <a:r>
-              <a:rPr lang="en-US" sz="1600" dirty="0" err="1">
+              <a:rPr lang="en-US" sz="1600" b="1" dirty="0" err="1">
                 <a:solidFill>
                   <a:srgbClr val="0070C0"/>
                 </a:solidFill>
@@ -11637,7 +11699,7 @@
               <a:t>Sys.getenv</a:t>
             </a:r>
             <a:r>
-              <a:rPr lang="en-US" sz="1600" dirty="0">
+              <a:rPr lang="en-US" sz="1600" b="1" dirty="0">
                 <a:solidFill>
                   <a:srgbClr val="0070C0"/>
                 </a:solidFill>
@@ -11649,7 +11711,7 @@
           </a:p>
           <a:p>
             <a:r>
-              <a:rPr lang="en-US" sz="1600" dirty="0">
+              <a:rPr lang="en-US" sz="1600" b="1" dirty="0">
                 <a:solidFill>
                   <a:srgbClr val="0070C0"/>
                 </a:solidFill>
@@ -11661,18 +11723,18 @@
           </a:p>
           <a:p>
             <a:r>
-              <a:rPr lang="en-US" sz="1600" dirty="0">
+              <a:rPr lang="en-US" sz="1600" b="1" dirty="0">
                 <a:solidFill>
                   <a:srgbClr val="0070C0"/>
                 </a:solidFill>
                 <a:latin typeface="Courier" pitchFamily="2" charset="0"/>
               </a:rPr>
-              <a:t># How many cores are available to my potentially multi-node job:</a:t>
-            </a:r>
-          </a:p>
-          <a:p>
-            <a:r>
-              <a:rPr lang="en-US" sz="1600" dirty="0">
+              <a:t># How many cores total are available to my potentially multi-node job:</a:t>
+            </a:r>
+          </a:p>
+          <a:p>
+            <a:r>
+              <a:rPr lang="en-US" sz="1600" b="1" dirty="0">
                 <a:solidFill>
                   <a:srgbClr val="0070C0"/>
                 </a:solidFill>
@@ -11682,7 +11744,7 @@
               <a:t>&gt; </a:t>
             </a:r>
             <a:r>
-              <a:rPr lang="en-US" sz="1600" dirty="0" err="1">
+              <a:rPr lang="en-US" sz="1600" b="1" dirty="0" err="1">
                 <a:solidFill>
                   <a:srgbClr val="0070C0"/>
                 </a:solidFill>
@@ -11692,7 +11754,7 @@
               <a:t>strtoi</a:t>
             </a:r>
             <a:r>
-              <a:rPr lang="en-US" sz="1600" dirty="0">
+              <a:rPr lang="en-US" sz="1600" b="1" dirty="0">
                 <a:solidFill>
                   <a:srgbClr val="0070C0"/>
                 </a:solidFill>
@@ -11702,7 +11764,7 @@
               <a:t>(</a:t>
             </a:r>
             <a:r>
-              <a:rPr lang="en-US" sz="1600" dirty="0" err="1">
+              <a:rPr lang="en-US" sz="1600" b="1" dirty="0" err="1">
                 <a:solidFill>
                   <a:srgbClr val="0070C0"/>
                 </a:solidFill>
@@ -11712,7 +11774,7 @@
               <a:t>Sys.getenv</a:t>
             </a:r>
             <a:r>
-              <a:rPr lang="en-US" sz="1600" dirty="0">
+              <a:rPr lang="en-US" sz="1600" b="1" dirty="0">
                 <a:solidFill>
                   <a:srgbClr val="0070C0"/>
                 </a:solidFill>
@@ -11724,7 +11786,7 @@
           </a:p>
           <a:p>
             <a:r>
-              <a:rPr lang="en-US" sz="1600" dirty="0">
+              <a:rPr lang="en-US" sz="1600" b="1" dirty="0">
                 <a:solidFill>
                   <a:srgbClr val="0070C0"/>
                 </a:solidFill>
@@ -11849,14 +11911,14 @@
             <a:pPr lvl="1"/>
             <a:r>
               <a:rPr lang="en-US" dirty="0"/>
-              <a:t>A few things are out of date:</a:t>
+              <a:t>A few things to note:</a:t>
             </a:r>
           </a:p>
           <a:p>
             <a:pPr lvl="2"/>
             <a:r>
               <a:rPr lang="en-US" dirty="0"/>
-              <a:t>Setting up a personal library: as we saw, R version 4.X handles (most) of this automatically</a:t>
+              <a:t>Setting up a personal library: as we saw, R version 4.X handles (most) of this automatically. This was not the case in R version 3.X.</a:t>
             </a:r>
           </a:p>
           <a:p>
@@ -11879,7 +11941,7 @@
             </a:r>
             <a:r>
               <a:rPr lang="en-US" dirty="0"/>
-              <a:t> exclusively</a:t>
+              <a:t> exclusively which solves some inter-compiler issues.</a:t>
             </a:r>
           </a:p>
           <a:p>

</xml_diff>